<commit_message>
update ppt and apex
</commit_message>
<xml_diff>
--- a/Final Project Review.pptx
+++ b/Final Project Review.pptx
@@ -21,6 +21,7 @@
     <p:sldId id="266" r:id="rId16"/>
     <p:sldId id="267" r:id="rId17"/>
     <p:sldId id="268" r:id="rId18"/>
+    <p:sldId id="269" r:id="rId19"/>
   </p:sldIdLst>
   <p:sldSz cy="5143500" cx="9144000"/>
   <p:notesSz cx="6858000" cy="9144000"/>
@@ -497,7 +498,7 @@
   <p:cSld>
     <p:spTree>
       <p:nvGrpSpPr>
-        <p:cNvPr id="108" name="Shape 108"/>
+        <p:cNvPr id="111" name="Shape 111"/>
         <p:cNvGrpSpPr/>
         <p:nvPr/>
       </p:nvGrpSpPr>
@@ -511,7 +512,7 @@
       </p:grpSpPr>
       <p:sp>
         <p:nvSpPr>
-          <p:cNvPr id="109" name="Shape 109"/>
+          <p:cNvPr id="112" name="Shape 112"/>
           <p:cNvSpPr/>
           <p:nvPr>
             <p:ph idx="2" type="sldImg"/>
@@ -555,7 +556,7 @@
       </p:sp>
       <p:sp>
         <p:nvSpPr>
-          <p:cNvPr id="110" name="Shape 110"/>
+          <p:cNvPr id="113" name="Shape 113"/>
           <p:cNvSpPr txBox="1"/>
           <p:nvPr>
             <p:ph idx="1" type="body"/>
@@ -583,9 +584,9 @@
               <a:buNone/>
             </a:pPr>
             <a:r>
-              <a:t/>
+              <a:rPr lang="en"/>
+              <a:t>When the Executive Director approves a RFE, he can set the Approval Review Date which is the date the Final Approval expires.</a:t>
             </a:r>
-            <a:endParaRPr/>
           </a:p>
         </p:txBody>
       </p:sp>
@@ -602,7 +603,7 @@
   <p:cSld>
     <p:spTree>
       <p:nvGrpSpPr>
-        <p:cNvPr id="113" name="Shape 113"/>
+        <p:cNvPr id="117" name="Shape 117"/>
         <p:cNvGrpSpPr/>
         <p:nvPr/>
       </p:nvGrpSpPr>
@@ -616,7 +617,7 @@
       </p:grpSpPr>
       <p:sp>
         <p:nvSpPr>
-          <p:cNvPr id="114" name="Shape 114"/>
+          <p:cNvPr id="118" name="Shape 118"/>
           <p:cNvSpPr/>
           <p:nvPr>
             <p:ph idx="2" type="sldImg"/>
@@ -660,7 +661,7 @@
       </p:sp>
       <p:sp>
         <p:nvSpPr>
-          <p:cNvPr id="115" name="Shape 115"/>
+          <p:cNvPr id="119" name="Shape 119"/>
           <p:cNvSpPr txBox="1"/>
           <p:nvPr>
             <p:ph idx="1" type="body"/>
@@ -681,7 +682,19 @@
           </a:bodyPr>
           <a:lstStyle/>
           <a:p>
-            <a:pPr>
+            <a:pPr rtl="0">
+              <a:spcBef>
+                <a:spcPts val="0"/>
+              </a:spcBef>
+              <a:buNone/>
+            </a:pPr>
+            <a:r>
+              <a:rPr lang="en"/>
+              <a:t>In the Employees page, employees are grouped by their types.</a:t>
+            </a:r>
+          </a:p>
+          <a:p>
+            <a:pPr rtl="0">
               <a:spcBef>
                 <a:spcPts val="0"/>
               </a:spcBef>
@@ -691,6 +704,18 @@
               <a:t/>
             </a:r>
             <a:endParaRPr/>
+          </a:p>
+          <a:p>
+            <a:pPr>
+              <a:spcBef>
+                <a:spcPts val="0"/>
+              </a:spcBef>
+              <a:buNone/>
+            </a:pPr>
+            <a:r>
+              <a:rPr lang="en"/>
+              <a:t>Since there can be only one Executive Director and Chairperson, you can create a new ED and CH only if there is none.</a:t>
+            </a:r>
           </a:p>
         </p:txBody>
       </p:sp>
@@ -707,7 +732,7 @@
   <p:cSld>
     <p:spTree>
       <p:nvGrpSpPr>
-        <p:cNvPr id="119" name="Shape 119"/>
+        <p:cNvPr id="122" name="Shape 122"/>
         <p:cNvGrpSpPr/>
         <p:nvPr/>
       </p:nvGrpSpPr>
@@ -721,7 +746,7 @@
       </p:grpSpPr>
       <p:sp>
         <p:nvSpPr>
-          <p:cNvPr id="120" name="Shape 120"/>
+          <p:cNvPr id="123" name="Shape 123"/>
           <p:cNvSpPr/>
           <p:nvPr>
             <p:ph idx="2" type="sldImg"/>
@@ -765,7 +790,7 @@
       </p:sp>
       <p:sp>
         <p:nvSpPr>
-          <p:cNvPr id="121" name="Shape 121"/>
+          <p:cNvPr id="124" name="Shape 124"/>
           <p:cNvSpPr txBox="1"/>
           <p:nvPr>
             <p:ph idx="1" type="body"/>
@@ -812,7 +837,7 @@
   <p:cSld>
     <p:spTree>
       <p:nvGrpSpPr>
-        <p:cNvPr id="130" name="Shape 130"/>
+        <p:cNvPr id="128" name="Shape 128"/>
         <p:cNvGrpSpPr/>
         <p:nvPr/>
       </p:nvGrpSpPr>
@@ -826,7 +851,7 @@
       </p:grpSpPr>
       <p:sp>
         <p:nvSpPr>
-          <p:cNvPr id="131" name="Shape 131"/>
+          <p:cNvPr id="129" name="Shape 129"/>
           <p:cNvSpPr/>
           <p:nvPr>
             <p:ph idx="2" type="sldImg"/>
@@ -870,7 +895,7 @@
       </p:sp>
       <p:sp>
         <p:nvSpPr>
-          <p:cNvPr id="132" name="Shape 132"/>
+          <p:cNvPr id="130" name="Shape 130"/>
           <p:cNvSpPr txBox="1"/>
           <p:nvPr>
             <p:ph idx="1" type="body"/>
@@ -891,16 +916,16 @@
           </a:bodyPr>
           <a:lstStyle/>
           <a:p>
-            <a:pPr>
+            <a:pPr lvl="0" rtl="0">
               <a:spcBef>
                 <a:spcPts val="0"/>
               </a:spcBef>
               <a:buNone/>
             </a:pPr>
             <a:r>
-              <a:t/>
+              <a:rPr lang="en"/>
+              <a:t>This application will allow you to view a few Quidditch teams, their respective players, and number of World Cup wins.</a:t>
             </a:r>
-            <a:endParaRPr/>
           </a:p>
         </p:txBody>
       </p:sp>
@@ -912,12 +937,12 @@
 </p:notes>
 </file>
 
-<file path=ppt/notesSlides/notesSlide2.xml><?xml version="1.0" encoding="utf-8"?>
+<file path=ppt/notesSlides/notesSlide14.xml><?xml version="1.0" encoding="utf-8"?>
 <p:notes xmlns:a="http://schemas.openxmlformats.org/drawingml/2006/main" xmlns:r="http://schemas.openxmlformats.org/officeDocument/2006/relationships" xmlns:mc="http://schemas.openxmlformats.org/markup-compatibility/2006" xmlns:mv="urn:schemas-microsoft-com:mac:vml" xmlns:p="http://schemas.openxmlformats.org/presentationml/2006/main" xmlns:c="http://schemas.openxmlformats.org/drawingml/2006/chart" xmlns:dgm="http://schemas.openxmlformats.org/drawingml/2006/diagram" xmlns:o="urn:schemas-microsoft-com:office:office" xmlns:v="urn:schemas-microsoft-com:vml" xmlns:pvml="urn:schemas-microsoft-com:office:powerpoint" xmlns:com="http://schemas.openxmlformats.org/drawingml/2006/compatibility" xmlns:p14="http://schemas.microsoft.com/office/powerpoint/2010/main" showMasterPhAnim="0" showMasterSp="0">
   <p:cSld>
     <p:spTree>
       <p:nvGrpSpPr>
-        <p:cNvPr id="58" name="Shape 58"/>
+        <p:cNvPr id="138" name="Shape 138"/>
         <p:cNvGrpSpPr/>
         <p:nvPr/>
       </p:nvGrpSpPr>
@@ -931,7 +956,7 @@
       </p:grpSpPr>
       <p:sp>
         <p:nvSpPr>
-          <p:cNvPr id="59" name="Shape 59"/>
+          <p:cNvPr id="139" name="Shape 139"/>
           <p:cNvSpPr/>
           <p:nvPr>
             <p:ph idx="2" type="sldImg"/>
@@ -975,7 +1000,7 @@
       </p:sp>
       <p:sp>
         <p:nvSpPr>
-          <p:cNvPr id="60" name="Shape 60"/>
+          <p:cNvPr id="140" name="Shape 140"/>
           <p:cNvSpPr txBox="1"/>
           <p:nvPr>
             <p:ph idx="1" type="body"/>
@@ -1017,12 +1042,12 @@
 </p:notes>
 </file>
 
-<file path=ppt/notesSlides/notesSlide3.xml><?xml version="1.0" encoding="utf-8"?>
+<file path=ppt/notesSlides/notesSlide2.xml><?xml version="1.0" encoding="utf-8"?>
 <p:notes xmlns:a="http://schemas.openxmlformats.org/drawingml/2006/main" xmlns:r="http://schemas.openxmlformats.org/officeDocument/2006/relationships" xmlns:mc="http://schemas.openxmlformats.org/markup-compatibility/2006" xmlns:mv="urn:schemas-microsoft-com:mac:vml" xmlns:p="http://schemas.openxmlformats.org/presentationml/2006/main" xmlns:c="http://schemas.openxmlformats.org/drawingml/2006/chart" xmlns:dgm="http://schemas.openxmlformats.org/drawingml/2006/diagram" xmlns:o="urn:schemas-microsoft-com:office:office" xmlns:v="urn:schemas-microsoft-com:vml" xmlns:pvml="urn:schemas-microsoft-com:office:powerpoint" xmlns:com="http://schemas.openxmlformats.org/drawingml/2006/compatibility" xmlns:p14="http://schemas.microsoft.com/office/powerpoint/2010/main" showMasterPhAnim="0" showMasterSp="0">
   <p:cSld>
     <p:spTree>
       <p:nvGrpSpPr>
-        <p:cNvPr id="64" name="Shape 64"/>
+        <p:cNvPr id="58" name="Shape 58"/>
         <p:cNvGrpSpPr/>
         <p:nvPr/>
       </p:nvGrpSpPr>
@@ -1036,7 +1061,7 @@
       </p:grpSpPr>
       <p:sp>
         <p:nvSpPr>
-          <p:cNvPr id="65" name="Shape 65"/>
+          <p:cNvPr id="59" name="Shape 59"/>
           <p:cNvSpPr/>
           <p:nvPr>
             <p:ph idx="2" type="sldImg"/>
@@ -1080,7 +1105,7 @@
       </p:sp>
       <p:sp>
         <p:nvSpPr>
-          <p:cNvPr id="66" name="Shape 66"/>
+          <p:cNvPr id="60" name="Shape 60"/>
           <p:cNvSpPr txBox="1"/>
           <p:nvPr>
             <p:ph idx="1" type="body"/>
@@ -1101,7 +1126,43 @@
           </a:bodyPr>
           <a:lstStyle/>
           <a:p>
-            <a:pPr>
+            <a:pPr rtl="0">
+              <a:spcBef>
+                <a:spcPts val="0"/>
+              </a:spcBef>
+              <a:buNone/>
+            </a:pPr>
+            <a:r>
+              <a:rPr lang="en"/>
+              <a:t>Used a single Hist table for tracking all statuses.</a:t>
+            </a:r>
+          </a:p>
+          <a:p>
+            <a:pPr rtl="0">
+              <a:spcBef>
+                <a:spcPts val="0"/>
+              </a:spcBef>
+              <a:buNone/>
+            </a:pPr>
+            <a:r>
+              <a:rPr lang="en"/>
+              <a:t>Current status is the row with the most recent date.</a:t>
+            </a:r>
+          </a:p>
+          <a:p>
+            <a:pPr rtl="0">
+              <a:spcBef>
+                <a:spcPts val="0"/>
+              </a:spcBef>
+              <a:buNone/>
+            </a:pPr>
+            <a:r>
+              <a:rPr lang="en"/>
+              <a:t>Status table is used just as a reference table for the RFE status.</a:t>
+            </a:r>
+          </a:p>
+          <a:p>
+            <a:pPr rtl="0">
               <a:spcBef>
                 <a:spcPts val="0"/>
               </a:spcBef>
@@ -1111,6 +1172,18 @@
               <a:t/>
             </a:r>
             <a:endParaRPr/>
+          </a:p>
+          <a:p>
+            <a:pPr>
+              <a:spcBef>
+                <a:spcPts val="0"/>
+              </a:spcBef>
+              <a:buNone/>
+            </a:pPr>
+            <a:r>
+              <a:rPr lang="en"/>
+              <a:t>One-to-many relationship between Auth and Emp.</a:t>
+            </a:r>
           </a:p>
         </p:txBody>
       </p:sp>
@@ -1122,12 +1195,12 @@
 </p:notes>
 </file>
 
-<file path=ppt/notesSlides/notesSlide4.xml><?xml version="1.0" encoding="utf-8"?>
+<file path=ppt/notesSlides/notesSlide3.xml><?xml version="1.0" encoding="utf-8"?>
 <p:notes xmlns:a="http://schemas.openxmlformats.org/drawingml/2006/main" xmlns:r="http://schemas.openxmlformats.org/officeDocument/2006/relationships" xmlns:mc="http://schemas.openxmlformats.org/markup-compatibility/2006" xmlns:mv="urn:schemas-microsoft-com:mac:vml" xmlns:p="http://schemas.openxmlformats.org/presentationml/2006/main" xmlns:c="http://schemas.openxmlformats.org/drawingml/2006/chart" xmlns:dgm="http://schemas.openxmlformats.org/drawingml/2006/diagram" xmlns:o="urn:schemas-microsoft-com:office:office" xmlns:v="urn:schemas-microsoft-com:vml" xmlns:pvml="urn:schemas-microsoft-com:office:powerpoint" xmlns:com="http://schemas.openxmlformats.org/drawingml/2006/compatibility" xmlns:p14="http://schemas.microsoft.com/office/powerpoint/2010/main" showMasterPhAnim="0" showMasterSp="0">
   <p:cSld>
     <p:spTree>
       <p:nvGrpSpPr>
-        <p:cNvPr id="70" name="Shape 70"/>
+        <p:cNvPr id="64" name="Shape 64"/>
         <p:cNvGrpSpPr/>
         <p:nvPr/>
       </p:nvGrpSpPr>
@@ -1141,7 +1214,7 @@
       </p:grpSpPr>
       <p:sp>
         <p:nvSpPr>
-          <p:cNvPr id="71" name="Shape 71"/>
+          <p:cNvPr id="65" name="Shape 65"/>
           <p:cNvSpPr/>
           <p:nvPr>
             <p:ph idx="2" type="sldImg"/>
@@ -1185,7 +1258,7 @@
       </p:sp>
       <p:sp>
         <p:nvSpPr>
-          <p:cNvPr id="72" name="Shape 72"/>
+          <p:cNvPr id="66" name="Shape 66"/>
           <p:cNvSpPr txBox="1"/>
           <p:nvPr>
             <p:ph idx="1" type="body"/>
@@ -1206,7 +1279,19 @@
           </a:bodyPr>
           <a:lstStyle/>
           <a:p>
-            <a:pPr>
+            <a:pPr rtl="0">
+              <a:spcBef>
+                <a:spcPts val="0"/>
+              </a:spcBef>
+              <a:buNone/>
+            </a:pPr>
+            <a:r>
+              <a:rPr lang="en"/>
+              <a:t>Created 3 tables for the 3 many-to-many relationships.</a:t>
+            </a:r>
+          </a:p>
+          <a:p>
+            <a:pPr rtl="0">
               <a:spcBef>
                 <a:spcPts val="0"/>
               </a:spcBef>
@@ -1216,6 +1301,42 @@
               <a:t/>
             </a:r>
             <a:endParaRPr/>
+          </a:p>
+          <a:p>
+            <a:pPr rtl="0">
+              <a:spcBef>
+                <a:spcPts val="0"/>
+              </a:spcBef>
+              <a:buNone/>
+            </a:pPr>
+            <a:r>
+              <a:rPr lang="en"/>
+              <a:t>Moved the effective_date into the Rfe_Task because that is the date a task is assigned to a RFE.</a:t>
+            </a:r>
+          </a:p>
+          <a:p>
+            <a:pPr rtl="0">
+              <a:spcBef>
+                <a:spcPts val="0"/>
+              </a:spcBef>
+              <a:buNone/>
+            </a:pPr>
+            <a:r>
+              <a:t/>
+            </a:r>
+            <a:endParaRPr/>
+          </a:p>
+          <a:p>
+            <a:pPr>
+              <a:spcBef>
+                <a:spcPts val="0"/>
+              </a:spcBef>
+              <a:buNone/>
+            </a:pPr>
+            <a:r>
+              <a:rPr lang="en"/>
+              <a:t>Role table has a one-to-many relationship with Contact table and Approver table.</a:t>
+            </a:r>
           </a:p>
         </p:txBody>
       </p:sp>
@@ -1227,12 +1348,12 @@
 </p:notes>
 </file>
 
-<file path=ppt/notesSlides/notesSlide5.xml><?xml version="1.0" encoding="utf-8"?>
+<file path=ppt/notesSlides/notesSlide4.xml><?xml version="1.0" encoding="utf-8"?>
 <p:notes xmlns:a="http://schemas.openxmlformats.org/drawingml/2006/main" xmlns:r="http://schemas.openxmlformats.org/officeDocument/2006/relationships" xmlns:mc="http://schemas.openxmlformats.org/markup-compatibility/2006" xmlns:mv="urn:schemas-microsoft-com:mac:vml" xmlns:p="http://schemas.openxmlformats.org/presentationml/2006/main" xmlns:c="http://schemas.openxmlformats.org/drawingml/2006/chart" xmlns:dgm="http://schemas.openxmlformats.org/drawingml/2006/diagram" xmlns:o="urn:schemas-microsoft-com:office:office" xmlns:v="urn:schemas-microsoft-com:vml" xmlns:pvml="urn:schemas-microsoft-com:office:powerpoint" xmlns:com="http://schemas.openxmlformats.org/drawingml/2006/compatibility" xmlns:p14="http://schemas.microsoft.com/office/powerpoint/2010/main" showMasterPhAnim="0" showMasterSp="0">
   <p:cSld>
     <p:spTree>
       <p:nvGrpSpPr>
-        <p:cNvPr id="78" name="Shape 78"/>
+        <p:cNvPr id="70" name="Shape 70"/>
         <p:cNvGrpSpPr/>
         <p:nvPr/>
       </p:nvGrpSpPr>
@@ -1246,7 +1367,7 @@
       </p:grpSpPr>
       <p:sp>
         <p:nvSpPr>
-          <p:cNvPr id="79" name="Shape 79"/>
+          <p:cNvPr id="71" name="Shape 71"/>
           <p:cNvSpPr/>
           <p:nvPr>
             <p:ph idx="2" type="sldImg"/>
@@ -1290,7 +1411,7 @@
       </p:sp>
       <p:sp>
         <p:nvSpPr>
-          <p:cNvPr id="80" name="Shape 80"/>
+          <p:cNvPr id="72" name="Shape 72"/>
           <p:cNvSpPr txBox="1"/>
           <p:nvPr>
             <p:ph idx="1" type="body"/>
@@ -1332,12 +1453,12 @@
 </p:notes>
 </file>
 
-<file path=ppt/notesSlides/notesSlide6.xml><?xml version="1.0" encoding="utf-8"?>
+<file path=ppt/notesSlides/notesSlide5.xml><?xml version="1.0" encoding="utf-8"?>
 <p:notes xmlns:a="http://schemas.openxmlformats.org/drawingml/2006/main" xmlns:r="http://schemas.openxmlformats.org/officeDocument/2006/relationships" xmlns:mc="http://schemas.openxmlformats.org/markup-compatibility/2006" xmlns:mv="urn:schemas-microsoft-com:mac:vml" xmlns:p="http://schemas.openxmlformats.org/presentationml/2006/main" xmlns:c="http://schemas.openxmlformats.org/drawingml/2006/chart" xmlns:dgm="http://schemas.openxmlformats.org/drawingml/2006/diagram" xmlns:o="urn:schemas-microsoft-com:office:office" xmlns:v="urn:schemas-microsoft-com:vml" xmlns:pvml="urn:schemas-microsoft-com:office:powerpoint" xmlns:com="http://schemas.openxmlformats.org/drawingml/2006/compatibility" xmlns:p14="http://schemas.microsoft.com/office/powerpoint/2010/main" showMasterPhAnim="0" showMasterSp="0">
   <p:cSld>
     <p:spTree>
       <p:nvGrpSpPr>
-        <p:cNvPr id="85" name="Shape 85"/>
+        <p:cNvPr id="79" name="Shape 79"/>
         <p:cNvGrpSpPr/>
         <p:nvPr/>
       </p:nvGrpSpPr>
@@ -1351,7 +1472,7 @@
       </p:grpSpPr>
       <p:sp>
         <p:nvSpPr>
-          <p:cNvPr id="86" name="Shape 86"/>
+          <p:cNvPr id="80" name="Shape 80"/>
           <p:cNvSpPr/>
           <p:nvPr>
             <p:ph idx="2" type="sldImg"/>
@@ -1395,7 +1516,7 @@
       </p:sp>
       <p:sp>
         <p:nvSpPr>
-          <p:cNvPr id="87" name="Shape 87"/>
+          <p:cNvPr id="81" name="Shape 81"/>
           <p:cNvSpPr txBox="1"/>
           <p:nvPr>
             <p:ph idx="1" type="body"/>
@@ -1416,7 +1537,31 @@
           </a:bodyPr>
           <a:lstStyle/>
           <a:p>
-            <a:pPr>
+            <a:pPr rtl="0">
+              <a:spcBef>
+                <a:spcPts val="0"/>
+              </a:spcBef>
+              <a:buNone/>
+            </a:pPr>
+            <a:r>
+              <a:rPr lang="en"/>
+              <a:t>Clicking the RFE ID will take you to the RFE Details page.</a:t>
+            </a:r>
+          </a:p>
+          <a:p>
+            <a:pPr rtl="0">
+              <a:spcBef>
+                <a:spcPts val="0"/>
+              </a:spcBef>
+              <a:buNone/>
+            </a:pPr>
+            <a:r>
+              <a:rPr lang="en"/>
+              <a:t>You can search for specific RFE’s with the search bar and you can sort RFE’s by clicking the column label.</a:t>
+            </a:r>
+          </a:p>
+          <a:p>
+            <a:pPr rtl="0">
               <a:spcBef>
                 <a:spcPts val="0"/>
               </a:spcBef>
@@ -1426,6 +1571,18 @@
               <a:t/>
             </a:r>
             <a:endParaRPr/>
+          </a:p>
+          <a:p>
+            <a:pPr>
+              <a:spcBef>
+                <a:spcPts val="0"/>
+              </a:spcBef>
+              <a:buNone/>
+            </a:pPr>
+            <a:r>
+              <a:rPr lang="en"/>
+              <a:t>Under Administration, you can access pages where you can create, edit, or view data.</a:t>
+            </a:r>
           </a:p>
         </p:txBody>
       </p:sp>
@@ -1437,12 +1594,12 @@
 </p:notes>
 </file>
 
-<file path=ppt/notesSlides/notesSlide7.xml><?xml version="1.0" encoding="utf-8"?>
+<file path=ppt/notesSlides/notesSlide6.xml><?xml version="1.0" encoding="utf-8"?>
 <p:notes xmlns:a="http://schemas.openxmlformats.org/drawingml/2006/main" xmlns:r="http://schemas.openxmlformats.org/officeDocument/2006/relationships" xmlns:mc="http://schemas.openxmlformats.org/markup-compatibility/2006" xmlns:mv="urn:schemas-microsoft-com:mac:vml" xmlns:p="http://schemas.openxmlformats.org/presentationml/2006/main" xmlns:c="http://schemas.openxmlformats.org/drawingml/2006/chart" xmlns:dgm="http://schemas.openxmlformats.org/drawingml/2006/diagram" xmlns:o="urn:schemas-microsoft-com:office:office" xmlns:v="urn:schemas-microsoft-com:vml" xmlns:pvml="urn:schemas-microsoft-com:office:powerpoint" xmlns:com="http://schemas.openxmlformats.org/drawingml/2006/compatibility" xmlns:p14="http://schemas.microsoft.com/office/powerpoint/2010/main" showMasterPhAnim="0" showMasterSp="0">
   <p:cSld>
     <p:spTree>
       <p:nvGrpSpPr>
-        <p:cNvPr id="91" name="Shape 91"/>
+        <p:cNvPr id="87" name="Shape 87"/>
         <p:cNvGrpSpPr/>
         <p:nvPr/>
       </p:nvGrpSpPr>
@@ -1456,7 +1613,7 @@
       </p:grpSpPr>
       <p:sp>
         <p:nvSpPr>
-          <p:cNvPr id="92" name="Shape 92"/>
+          <p:cNvPr id="88" name="Shape 88"/>
           <p:cNvSpPr/>
           <p:nvPr>
             <p:ph idx="2" type="sldImg"/>
@@ -1500,7 +1657,7 @@
       </p:sp>
       <p:sp>
         <p:nvSpPr>
-          <p:cNvPr id="93" name="Shape 93"/>
+          <p:cNvPr id="89" name="Shape 89"/>
           <p:cNvSpPr txBox="1"/>
           <p:nvPr>
             <p:ph idx="1" type="body"/>
@@ -1521,16 +1678,28 @@
           </a:bodyPr>
           <a:lstStyle/>
           <a:p>
-            <a:pPr>
+            <a:pPr rtl="0">
               <a:spcBef>
                 <a:spcPts val="0"/>
               </a:spcBef>
               <a:buNone/>
             </a:pPr>
             <a:r>
-              <a:t/>
+              <a:rPr lang="en"/>
+              <a:t>At the bottom of the RFE page, there is a report that lists all RFE’s (ID not clickable).</a:t>
             </a:r>
-            <a:endParaRPr/>
+          </a:p>
+          <a:p>
+            <a:pPr>
+              <a:spcBef>
+                <a:spcPts val="0"/>
+              </a:spcBef>
+              <a:buNone/>
+            </a:pPr>
+            <a:r>
+              <a:rPr lang="en"/>
+              <a:t>Below that, are reports that show RFE’s that are about to expire and that recently expired.</a:t>
+            </a:r>
           </a:p>
         </p:txBody>
       </p:sp>
@@ -1542,12 +1711,12 @@
 </p:notes>
 </file>
 
-<file path=ppt/notesSlides/notesSlide8.xml><?xml version="1.0" encoding="utf-8"?>
+<file path=ppt/notesSlides/notesSlide7.xml><?xml version="1.0" encoding="utf-8"?>
 <p:notes xmlns:a="http://schemas.openxmlformats.org/drawingml/2006/main" xmlns:r="http://schemas.openxmlformats.org/officeDocument/2006/relationships" xmlns:mc="http://schemas.openxmlformats.org/markup-compatibility/2006" xmlns:mv="urn:schemas-microsoft-com:mac:vml" xmlns:p="http://schemas.openxmlformats.org/presentationml/2006/main" xmlns:c="http://schemas.openxmlformats.org/drawingml/2006/chart" xmlns:dgm="http://schemas.openxmlformats.org/drawingml/2006/diagram" xmlns:o="urn:schemas-microsoft-com:office:office" xmlns:v="urn:schemas-microsoft-com:vml" xmlns:pvml="urn:schemas-microsoft-com:office:powerpoint" xmlns:com="http://schemas.openxmlformats.org/drawingml/2006/compatibility" xmlns:p14="http://schemas.microsoft.com/office/powerpoint/2010/main" showMasterPhAnim="0" showMasterSp="0">
   <p:cSld>
     <p:spTree>
       <p:nvGrpSpPr>
-        <p:cNvPr id="97" name="Shape 97"/>
+        <p:cNvPr id="93" name="Shape 93"/>
         <p:cNvGrpSpPr/>
         <p:nvPr/>
       </p:nvGrpSpPr>
@@ -1561,7 +1730,7 @@
       </p:grpSpPr>
       <p:sp>
         <p:nvSpPr>
-          <p:cNvPr id="98" name="Shape 98"/>
+          <p:cNvPr id="94" name="Shape 94"/>
           <p:cNvSpPr/>
           <p:nvPr>
             <p:ph idx="2" type="sldImg"/>
@@ -1605,7 +1774,7 @@
       </p:sp>
       <p:sp>
         <p:nvSpPr>
-          <p:cNvPr id="99" name="Shape 99"/>
+          <p:cNvPr id="95" name="Shape 95"/>
           <p:cNvSpPr txBox="1"/>
           <p:nvPr>
             <p:ph idx="1" type="body"/>
@@ -1626,7 +1795,43 @@
           </a:bodyPr>
           <a:lstStyle/>
           <a:p>
-            <a:pPr>
+            <a:pPr rtl="0">
+              <a:spcBef>
+                <a:spcPts val="0"/>
+              </a:spcBef>
+              <a:buNone/>
+            </a:pPr>
+            <a:r>
+              <a:rPr lang="en"/>
+              <a:t>The Lab director’s, Chairperson’s, and Executive Director’s view of the RFE Details page is similar to this.</a:t>
+            </a:r>
+          </a:p>
+          <a:p>
+            <a:pPr rtl="0">
+              <a:spcBef>
+                <a:spcPts val="0"/>
+              </a:spcBef>
+              <a:buNone/>
+            </a:pPr>
+            <a:r>
+              <a:rPr lang="en"/>
+              <a:t>Only difference is the “Approve” button.</a:t>
+            </a:r>
+          </a:p>
+          <a:p>
+            <a:pPr rtl="0">
+              <a:spcBef>
+                <a:spcPts val="0"/>
+              </a:spcBef>
+              <a:buNone/>
+            </a:pPr>
+            <a:r>
+              <a:rPr lang="en"/>
+              <a:t>The Requestor’s view of the RFE Details page have “Submit” or “Recall” button, and a “Duplicate” button.</a:t>
+            </a:r>
+          </a:p>
+          <a:p>
+            <a:pPr rtl="0">
               <a:spcBef>
                 <a:spcPts val="0"/>
               </a:spcBef>
@@ -1636,6 +1841,18 @@
               <a:t/>
             </a:r>
             <a:endParaRPr/>
+          </a:p>
+          <a:p>
+            <a:pPr>
+              <a:spcBef>
+                <a:spcPts val="0"/>
+              </a:spcBef>
+              <a:buNone/>
+            </a:pPr>
+            <a:r>
+              <a:rPr lang="en"/>
+              <a:t>Approvers for RFE’s are automatically added based on the Requestor’s lab when a RFE is created.</a:t>
+            </a:r>
           </a:p>
         </p:txBody>
       </p:sp>
@@ -1647,12 +1864,12 @@
 </p:notes>
 </file>
 
-<file path=ppt/notesSlides/notesSlide9.xml><?xml version="1.0" encoding="utf-8"?>
+<file path=ppt/notesSlides/notesSlide8.xml><?xml version="1.0" encoding="utf-8"?>
 <p:notes xmlns:a="http://schemas.openxmlformats.org/drawingml/2006/main" xmlns:r="http://schemas.openxmlformats.org/officeDocument/2006/relationships" xmlns:mc="http://schemas.openxmlformats.org/markup-compatibility/2006" xmlns:mv="urn:schemas-microsoft-com:mac:vml" xmlns:p="http://schemas.openxmlformats.org/presentationml/2006/main" xmlns:c="http://schemas.openxmlformats.org/drawingml/2006/chart" xmlns:dgm="http://schemas.openxmlformats.org/drawingml/2006/diagram" xmlns:o="urn:schemas-microsoft-com:office:office" xmlns:v="urn:schemas-microsoft-com:vml" xmlns:pvml="urn:schemas-microsoft-com:office:powerpoint" xmlns:com="http://schemas.openxmlformats.org/drawingml/2006/compatibility" xmlns:p14="http://schemas.microsoft.com/office/powerpoint/2010/main" showMasterPhAnim="0" showMasterSp="0">
   <p:cSld>
     <p:spTree>
       <p:nvGrpSpPr>
-        <p:cNvPr id="102" name="Shape 102"/>
+        <p:cNvPr id="99" name="Shape 99"/>
         <p:cNvGrpSpPr/>
         <p:nvPr/>
       </p:nvGrpSpPr>
@@ -1666,7 +1883,7 @@
       </p:grpSpPr>
       <p:sp>
         <p:nvSpPr>
-          <p:cNvPr id="103" name="Shape 103"/>
+          <p:cNvPr id="100" name="Shape 100"/>
           <p:cNvSpPr/>
           <p:nvPr>
             <p:ph idx="2" type="sldImg"/>
@@ -1710,7 +1927,7 @@
       </p:sp>
       <p:sp>
         <p:nvSpPr>
-          <p:cNvPr id="104" name="Shape 104"/>
+          <p:cNvPr id="101" name="Shape 101"/>
           <p:cNvSpPr txBox="1"/>
           <p:nvPr>
             <p:ph idx="1" type="body"/>
@@ -1741,6 +1958,135 @@
               <a:t/>
             </a:r>
             <a:endParaRPr/>
+          </a:p>
+        </p:txBody>
+      </p:sp>
+    </p:spTree>
+  </p:cSld>
+  <p:clrMapOvr>
+    <a:masterClrMapping/>
+  </p:clrMapOvr>
+</p:notes>
+</file>
+
+<file path=ppt/notesSlides/notesSlide9.xml><?xml version="1.0" encoding="utf-8"?>
+<p:notes xmlns:a="http://schemas.openxmlformats.org/drawingml/2006/main" xmlns:r="http://schemas.openxmlformats.org/officeDocument/2006/relationships" xmlns:mc="http://schemas.openxmlformats.org/markup-compatibility/2006" xmlns:mv="urn:schemas-microsoft-com:mac:vml" xmlns:p="http://schemas.openxmlformats.org/presentationml/2006/main" xmlns:c="http://schemas.openxmlformats.org/drawingml/2006/chart" xmlns:dgm="http://schemas.openxmlformats.org/drawingml/2006/diagram" xmlns:o="urn:schemas-microsoft-com:office:office" xmlns:v="urn:schemas-microsoft-com:vml" xmlns:pvml="urn:schemas-microsoft-com:office:powerpoint" xmlns:com="http://schemas.openxmlformats.org/drawingml/2006/compatibility" xmlns:p14="http://schemas.microsoft.com/office/powerpoint/2010/main" showMasterPhAnim="0" showMasterSp="0">
+  <p:cSld>
+    <p:spTree>
+      <p:nvGrpSpPr>
+        <p:cNvPr id="105" name="Shape 105"/>
+        <p:cNvGrpSpPr/>
+        <p:nvPr/>
+      </p:nvGrpSpPr>
+      <p:grpSpPr>
+        <a:xfrm>
+          <a:off x="0" y="0"/>
+          <a:ext cx="0" cy="0"/>
+          <a:chOff x="0" y="0"/>
+          <a:chExt cx="0" cy="0"/>
+        </a:xfrm>
+      </p:grpSpPr>
+      <p:sp>
+        <p:nvSpPr>
+          <p:cNvPr id="106" name="Shape 106"/>
+          <p:cNvSpPr/>
+          <p:nvPr>
+            <p:ph idx="2" type="sldImg"/>
+          </p:nvPr>
+        </p:nvSpPr>
+        <p:spPr>
+          <a:xfrm>
+            <a:off x="381300" y="685800"/>
+            <a:ext cx="6096000" cy="3429000"/>
+          </a:xfrm>
+          <a:custGeom>
+            <a:pathLst>
+              <a:path extrusionOk="0" h="120000" w="120000">
+                <a:moveTo>
+                  <a:pt x="0" y="0"/>
+                </a:moveTo>
+                <a:lnTo>
+                  <a:pt x="120000" y="0"/>
+                </a:lnTo>
+                <a:lnTo>
+                  <a:pt x="120000" y="120000"/>
+                </a:lnTo>
+                <a:lnTo>
+                  <a:pt x="0" y="120000"/>
+                </a:lnTo>
+                <a:close/>
+              </a:path>
+            </a:pathLst>
+          </a:custGeom>
+          <a:noFill/>
+          <a:ln cap="flat" cmpd="sng" w="9525">
+            <a:solidFill>
+              <a:srgbClr val="000000"/>
+            </a:solidFill>
+            <a:prstDash val="solid"/>
+            <a:round/>
+            <a:headEnd len="med" w="med" type="none"/>
+            <a:tailEnd len="med" w="med" type="none"/>
+          </a:ln>
+        </p:spPr>
+      </p:sp>
+      <p:sp>
+        <p:nvSpPr>
+          <p:cNvPr id="107" name="Shape 107"/>
+          <p:cNvSpPr txBox="1"/>
+          <p:nvPr>
+            <p:ph idx="1" type="body"/>
+          </p:nvPr>
+        </p:nvSpPr>
+        <p:spPr>
+          <a:xfrm>
+            <a:off x="685800" y="4343400"/>
+            <a:ext cx="5486399" cy="4114800"/>
+          </a:xfrm>
+          <a:prstGeom prst="rect">
+            <a:avLst/>
+          </a:prstGeom>
+        </p:spPr>
+        <p:txBody>
+          <a:bodyPr anchorCtr="0" anchor="t" bIns="91425" lIns="91425" rIns="91425" tIns="91425">
+            <a:noAutofit/>
+          </a:bodyPr>
+          <a:lstStyle/>
+          <a:p>
+            <a:pPr rtl="0">
+              <a:spcBef>
+                <a:spcPts val="0"/>
+              </a:spcBef>
+              <a:buNone/>
+            </a:pPr>
+            <a:r>
+              <a:rPr lang="en"/>
+              <a:t>RFE Details page also shows FYI Reviewers, Tasks, Tracking Comments, and Documents.</a:t>
+            </a:r>
+          </a:p>
+          <a:p>
+            <a:pPr rtl="0">
+              <a:spcBef>
+                <a:spcPts val="0"/>
+              </a:spcBef>
+              <a:buNone/>
+            </a:pPr>
+            <a:r>
+              <a:t/>
+            </a:r>
+            <a:endParaRPr/>
+          </a:p>
+          <a:p>
+            <a:pPr>
+              <a:spcBef>
+                <a:spcPts val="0"/>
+              </a:spcBef>
+              <a:buNone/>
+            </a:pPr>
+            <a:r>
+              <a:rPr lang="en"/>
+              <a:t>After a RFE is submitted, only Comments can be added.</a:t>
+            </a:r>
           </a:p>
         </p:txBody>
       </p:sp>
@@ -5066,7 +5412,7 @@
   <p:cSld>
     <p:spTree>
       <p:nvGrpSpPr>
-        <p:cNvPr id="105" name="Shape 105"/>
+        <p:cNvPr id="108" name="Shape 108"/>
         <p:cNvGrpSpPr/>
         <p:nvPr/>
       </p:nvGrpSpPr>
@@ -5080,7 +5426,7 @@
       </p:grpSpPr>
       <p:pic>
         <p:nvPicPr>
-          <p:cNvPr id="106" name="Shape 106"/>
+          <p:cNvPr id="109" name="Shape 109"/>
           <p:cNvPicPr preferRelativeResize="0"/>
           <p:nvPr/>
         </p:nvPicPr>
@@ -5094,8 +5440,8 @@
         </p:blipFill>
         <p:spPr>
           <a:xfrm>
-            <a:off x="0" y="14765"/>
-            <a:ext cx="9143999" cy="5113969"/>
+            <a:off x="0" y="0"/>
+            <a:ext cx="9144001" cy="5143501"/>
           </a:xfrm>
           <a:prstGeom prst="rect">
             <a:avLst/>
@@ -5108,14 +5454,14 @@
       </p:pic>
       <p:sp>
         <p:nvSpPr>
-          <p:cNvPr id="107" name="Shape 107"/>
+          <p:cNvPr id="110" name="Shape 110"/>
           <p:cNvSpPr/>
           <p:nvPr/>
         </p:nvSpPr>
         <p:spPr>
           <a:xfrm>
-            <a:off x="0" y="882000"/>
-            <a:ext cx="1364699" cy="260099"/>
+            <a:off x="5272675" y="692425"/>
+            <a:ext cx="663600" cy="260099"/>
           </a:xfrm>
           <a:prstGeom prst="rect">
             <a:avLst/>
@@ -5166,7 +5512,7 @@
   <p:cSld>
     <p:spTree>
       <p:nvGrpSpPr>
-        <p:cNvPr id="111" name="Shape 111"/>
+        <p:cNvPr id="114" name="Shape 114"/>
         <p:cNvGrpSpPr/>
         <p:nvPr/>
       </p:nvGrpSpPr>
@@ -5178,22 +5524,58 @@
           <a:chExt cx="0" cy="0"/>
         </a:xfrm>
       </p:grpSpPr>
-      <p:sp>
-        <p:nvSpPr>
-          <p:cNvPr id="112" name="Shape 112"/>
-          <p:cNvSpPr txBox="1"/>
-          <p:nvPr>
-            <p:ph type="title"/>
-          </p:nvPr>
-        </p:nvSpPr>
-        <p:spPr>
-          <a:xfrm>
-            <a:off x="311700" y="2150850"/>
-            <a:ext cx="8520599" cy="841800"/>
-          </a:xfrm>
-          <a:prstGeom prst="rect">
-            <a:avLst/>
-          </a:prstGeom>
+      <p:pic>
+        <p:nvPicPr>
+          <p:cNvPr id="115" name="Shape 115"/>
+          <p:cNvPicPr preferRelativeResize="0"/>
+          <p:nvPr/>
+        </p:nvPicPr>
+        <p:blipFill>
+          <a:blip r:embed="rId3">
+            <a:alphaModFix/>
+          </a:blip>
+          <a:stretch>
+            <a:fillRect/>
+          </a:stretch>
+        </p:blipFill>
+        <p:spPr>
+          <a:xfrm>
+            <a:off x="0" y="14765"/>
+            <a:ext cx="9143999" cy="5113969"/>
+          </a:xfrm>
+          <a:prstGeom prst="rect">
+            <a:avLst/>
+          </a:prstGeom>
+          <a:noFill/>
+          <a:ln>
+            <a:noFill/>
+          </a:ln>
+        </p:spPr>
+      </p:pic>
+      <p:sp>
+        <p:nvSpPr>
+          <p:cNvPr id="116" name="Shape 116"/>
+          <p:cNvSpPr/>
+          <p:nvPr/>
+        </p:nvSpPr>
+        <p:spPr>
+          <a:xfrm>
+            <a:off x="0" y="882000"/>
+            <a:ext cx="1364699" cy="260099"/>
+          </a:xfrm>
+          <a:prstGeom prst="rect">
+            <a:avLst/>
+          </a:prstGeom>
+          <a:noFill/>
+          <a:ln cap="flat" cmpd="sng" w="38100">
+            <a:solidFill>
+              <a:srgbClr val="FF0000"/>
+            </a:solidFill>
+            <a:prstDash val="solid"/>
+            <a:round/>
+            <a:headEnd len="med" w="med" type="none"/>
+            <a:tailEnd len="med" w="med" type="none"/>
+          </a:ln>
         </p:spPr>
         <p:txBody>
           <a:bodyPr anchorCtr="0" anchor="ctr" bIns="91425" lIns="91425" rIns="91425" tIns="91425">
@@ -5208,9 +5590,9 @@
               <a:buNone/>
             </a:pPr>
             <a:r>
-              <a:rPr lang="en"/>
-              <a:t>Part 2: APEX Mobile App</a:t>
+              <a:t/>
             </a:r>
+            <a:endParaRPr/>
           </a:p>
         </p:txBody>
       </p:sp>
@@ -5230,7 +5612,7 @@
   <p:cSld>
     <p:spTree>
       <p:nvGrpSpPr>
-        <p:cNvPr id="116" name="Shape 116"/>
+        <p:cNvPr id="120" name="Shape 120"/>
         <p:cNvGrpSpPr/>
         <p:nvPr/>
       </p:nvGrpSpPr>
@@ -5244,7 +5626,7 @@
       </p:grpSpPr>
       <p:sp>
         <p:nvSpPr>
-          <p:cNvPr id="117" name="Shape 117"/>
+          <p:cNvPr id="121" name="Shape 121"/>
           <p:cNvSpPr txBox="1"/>
           <p:nvPr>
             <p:ph type="title"/>
@@ -5252,15 +5634,15 @@
         </p:nvSpPr>
         <p:spPr>
           <a:xfrm>
-            <a:off x="311700" y="257200"/>
-            <a:ext cx="8520599" cy="572699"/>
+            <a:off x="311700" y="2150850"/>
+            <a:ext cx="8520599" cy="841800"/>
           </a:xfrm>
           <a:prstGeom prst="rect">
             <a:avLst/>
           </a:prstGeom>
         </p:spPr>
         <p:txBody>
-          <a:bodyPr anchorCtr="0" anchor="t" bIns="91425" lIns="91425" rIns="91425" tIns="91425">
+          <a:bodyPr anchorCtr="0" anchor="ctr" bIns="91425" lIns="91425" rIns="91425" tIns="91425">
             <a:noAutofit/>
           </a:bodyPr>
           <a:lstStyle/>
@@ -5273,39 +5655,11 @@
             </a:pPr>
             <a:r>
               <a:rPr lang="en"/>
-              <a:t>Conceptual Model</a:t>
+              <a:t>Part 2: APEX Mobile App</a:t>
             </a:r>
           </a:p>
         </p:txBody>
       </p:sp>
-      <p:pic>
-        <p:nvPicPr>
-          <p:cNvPr id="118" name="Shape 118"/>
-          <p:cNvPicPr preferRelativeResize="0"/>
-          <p:nvPr/>
-        </p:nvPicPr>
-        <p:blipFill>
-          <a:blip r:embed="rId3">
-            <a:alphaModFix/>
-          </a:blip>
-          <a:stretch>
-            <a:fillRect/>
-          </a:stretch>
-        </p:blipFill>
-        <p:spPr>
-          <a:xfrm>
-            <a:off x="3308661" y="829900"/>
-            <a:ext cx="2526674" cy="3992924"/>
-          </a:xfrm>
-          <a:prstGeom prst="rect">
-            <a:avLst/>
-          </a:prstGeom>
-          <a:noFill/>
-          <a:ln>
-            <a:noFill/>
-          </a:ln>
-        </p:spPr>
-      </p:pic>
     </p:spTree>
   </p:cSld>
   <p:clrMapOvr>
@@ -5322,7 +5676,7 @@
   <p:cSld>
     <p:spTree>
       <p:nvGrpSpPr>
-        <p:cNvPr id="122" name="Shape 122"/>
+        <p:cNvPr id="125" name="Shape 125"/>
         <p:cNvGrpSpPr/>
         <p:nvPr/>
       </p:nvGrpSpPr>
@@ -5336,16 +5690,16 @@
       </p:grpSpPr>
       <p:sp>
         <p:nvSpPr>
-          <p:cNvPr id="123" name="Shape 123"/>
+          <p:cNvPr id="126" name="Shape 126"/>
           <p:cNvSpPr txBox="1"/>
           <p:nvPr>
-            <p:ph idx="1" type="body"/>
+            <p:ph type="title"/>
           </p:nvPr>
         </p:nvSpPr>
         <p:spPr>
           <a:xfrm>
-            <a:off x="113225" y="100625"/>
-            <a:ext cx="8903700" cy="566100"/>
+            <a:off x="311700" y="257200"/>
+            <a:ext cx="8520599" cy="572699"/>
           </a:xfrm>
           <a:prstGeom prst="rect">
             <a:avLst/>
@@ -5357,7 +5711,7 @@
           </a:bodyPr>
           <a:lstStyle/>
           <a:p>
-            <a:pPr lvl="0">
+            <a:pPr>
               <a:spcBef>
                 <a:spcPts val="0"/>
               </a:spcBef>
@@ -5365,14 +5719,14 @@
             </a:pPr>
             <a:r>
               <a:rPr lang="en"/>
-              <a:t>This application will allow you to view a few Quidditch teams, their respective players, and number of World Cup wins.</a:t>
+              <a:t>Conceptual Model</a:t>
             </a:r>
           </a:p>
         </p:txBody>
       </p:sp>
       <p:pic>
         <p:nvPicPr>
-          <p:cNvPr id="124" name="Shape 124"/>
+          <p:cNvPr id="127" name="Shape 127"/>
           <p:cNvPicPr preferRelativeResize="0"/>
           <p:nvPr/>
         </p:nvPicPr>
@@ -5386,8 +5740,8 @@
         </p:blipFill>
         <p:spPr>
           <a:xfrm>
-            <a:off x="6335923" y="816997"/>
-            <a:ext cx="2411549" cy="4289377"/>
+            <a:off x="3308661" y="829900"/>
+            <a:ext cx="2526674" cy="3992924"/>
           </a:xfrm>
           <a:prstGeom prst="rect">
             <a:avLst/>
@@ -5398,9 +5752,65 @@
           </a:ln>
         </p:spPr>
       </p:pic>
+    </p:spTree>
+  </p:cSld>
+  <p:clrMapOvr>
+    <a:masterClrMapping/>
+  </p:clrMapOvr>
+  <p:transition spd="slow">
+    <p:cut/>
+  </p:transition>
+</p:sld>
+</file>
+
+<file path=ppt/slides/slide14.xml><?xml version="1.0" encoding="utf-8"?>
+<p:sld xmlns:a="http://schemas.openxmlformats.org/drawingml/2006/main" xmlns:r="http://schemas.openxmlformats.org/officeDocument/2006/relationships" xmlns:mc="http://schemas.openxmlformats.org/markup-compatibility/2006" xmlns:mv="urn:schemas-microsoft-com:mac:vml" xmlns:p="http://schemas.openxmlformats.org/presentationml/2006/main" xmlns:c="http://schemas.openxmlformats.org/drawingml/2006/chart" xmlns:dgm="http://schemas.openxmlformats.org/drawingml/2006/diagram" xmlns:o="urn:schemas-microsoft-com:office:office" xmlns:v="urn:schemas-microsoft-com:vml" xmlns:pvml="urn:schemas-microsoft-com:office:powerpoint" xmlns:com="http://schemas.openxmlformats.org/drawingml/2006/compatibility" xmlns:p14="http://schemas.microsoft.com/office/powerpoint/2010/main">
+  <p:cSld>
+    <p:spTree>
+      <p:nvGrpSpPr>
+        <p:cNvPr id="131" name="Shape 131"/>
+        <p:cNvGrpSpPr/>
+        <p:nvPr/>
+      </p:nvGrpSpPr>
+      <p:grpSpPr>
+        <a:xfrm>
+          <a:off x="0" y="0"/>
+          <a:ext cx="0" cy="0"/>
+          <a:chOff x="0" y="0"/>
+          <a:chExt cx="0" cy="0"/>
+        </a:xfrm>
+      </p:grpSpPr>
       <p:pic>
         <p:nvPicPr>
-          <p:cNvPr id="125" name="Shape 125"/>
+          <p:cNvPr id="132" name="Shape 132"/>
+          <p:cNvPicPr preferRelativeResize="0"/>
+          <p:nvPr/>
+        </p:nvPicPr>
+        <p:blipFill>
+          <a:blip r:embed="rId3">
+            <a:alphaModFix/>
+          </a:blip>
+          <a:stretch>
+            <a:fillRect/>
+          </a:stretch>
+        </p:blipFill>
+        <p:spPr>
+          <a:xfrm>
+            <a:off x="6139025" y="74409"/>
+            <a:ext cx="2808075" cy="4994666"/>
+          </a:xfrm>
+          <a:prstGeom prst="rect">
+            <a:avLst/>
+          </a:prstGeom>
+          <a:noFill/>
+          <a:ln>
+            <a:noFill/>
+          </a:ln>
+        </p:spPr>
+      </p:pic>
+      <p:pic>
+        <p:nvPicPr>
+          <p:cNvPr id="133" name="Shape 133"/>
           <p:cNvPicPr preferRelativeResize="0"/>
           <p:nvPr/>
         </p:nvPicPr>
@@ -5414,8 +5824,8 @@
         </p:blipFill>
         <p:spPr>
           <a:xfrm>
-            <a:off x="3366223" y="854135"/>
-            <a:ext cx="2411549" cy="4289377"/>
+            <a:off x="3167950" y="74407"/>
+            <a:ext cx="2808075" cy="4994666"/>
           </a:xfrm>
           <a:prstGeom prst="rect">
             <a:avLst/>
@@ -5428,13 +5838,13 @@
       </p:pic>
       <p:sp>
         <p:nvSpPr>
-          <p:cNvPr id="126" name="Shape 126"/>
+          <p:cNvPr id="134" name="Shape 134"/>
           <p:cNvSpPr/>
           <p:nvPr/>
         </p:nvSpPr>
         <p:spPr>
           <a:xfrm>
-            <a:off x="4623600" y="2599575"/>
+            <a:off x="4670575" y="2106925"/>
             <a:ext cx="677699" cy="278399"/>
           </a:xfrm>
           <a:prstGeom prst="rect">
@@ -5472,14 +5882,14 @@
       </p:sp>
       <p:sp>
         <p:nvSpPr>
-          <p:cNvPr id="127" name="Shape 127"/>
+          <p:cNvPr id="135" name="Shape 135"/>
           <p:cNvSpPr/>
           <p:nvPr/>
         </p:nvSpPr>
         <p:spPr>
           <a:xfrm>
-            <a:off x="6452800" y="3147375"/>
-            <a:ext cx="1091700" cy="278399"/>
+            <a:off x="6311900" y="2771600"/>
+            <a:ext cx="1215299" cy="278399"/>
           </a:xfrm>
           <a:prstGeom prst="rect">
             <a:avLst/>
@@ -5516,7 +5926,7 @@
       </p:sp>
       <p:pic>
         <p:nvPicPr>
-          <p:cNvPr id="128" name="Shape 128"/>
+          <p:cNvPr id="136" name="Shape 136"/>
           <p:cNvPicPr preferRelativeResize="0"/>
           <p:nvPr/>
         </p:nvPicPr>
@@ -5530,8 +5940,8 @@
         </p:blipFill>
         <p:spPr>
           <a:xfrm>
-            <a:off x="396523" y="816997"/>
-            <a:ext cx="2411549" cy="4289377"/>
+            <a:off x="117450" y="74409"/>
+            <a:ext cx="2808075" cy="4994666"/>
           </a:xfrm>
           <a:prstGeom prst="rect">
             <a:avLst/>
@@ -5544,13 +5954,13 @@
       </p:pic>
       <p:sp>
         <p:nvSpPr>
-          <p:cNvPr id="129" name="Shape 129"/>
+          <p:cNvPr id="137" name="Shape 137"/>
           <p:cNvSpPr/>
           <p:nvPr/>
         </p:nvSpPr>
         <p:spPr>
           <a:xfrm>
-            <a:off x="518325" y="2553175"/>
+            <a:off x="306950" y="2106925"/>
             <a:ext cx="762899" cy="278399"/>
           </a:xfrm>
           <a:prstGeom prst="rect">
@@ -5970,8 +6380,8 @@
         </p:nvSpPr>
         <p:spPr>
           <a:xfrm>
-            <a:off x="5925750" y="218375"/>
-            <a:ext cx="3031499" cy="656999"/>
+            <a:off x="4465750" y="218375"/>
+            <a:ext cx="4491600" cy="656999"/>
           </a:xfrm>
           <a:prstGeom prst="rect">
             <a:avLst/>
@@ -5999,7 +6409,7 @@
                   <a:srgbClr val="FF0000"/>
                 </a:solidFill>
               </a:rPr>
-              <a:t>Requestors view of the RFE page.</a:t>
+              <a:t>Regular lab employee’s view of the RFE page.</a:t>
             </a:r>
           </a:p>
         </p:txBody>
@@ -6043,6 +6453,50 @@
               </a:rPr>
               <a:t>RFE’s the logged in employee is a contact of.</a:t>
             </a:r>
+          </a:p>
+        </p:txBody>
+      </p:sp>
+      <p:sp>
+        <p:nvSpPr>
+          <p:cNvPr id="78" name="Shape 78"/>
+          <p:cNvSpPr/>
+          <p:nvPr/>
+        </p:nvSpPr>
+        <p:spPr>
+          <a:xfrm>
+            <a:off x="1925875" y="1726250"/>
+            <a:ext cx="317100" cy="164400"/>
+          </a:xfrm>
+          <a:prstGeom prst="rect">
+            <a:avLst/>
+          </a:prstGeom>
+          <a:noFill/>
+          <a:ln cap="flat" cmpd="sng" w="28575">
+            <a:solidFill>
+              <a:srgbClr val="FF0000"/>
+            </a:solidFill>
+            <a:prstDash val="solid"/>
+            <a:round/>
+            <a:headEnd len="med" w="med" type="none"/>
+            <a:tailEnd len="med" w="med" type="none"/>
+          </a:ln>
+        </p:spPr>
+        <p:txBody>
+          <a:bodyPr anchorCtr="0" anchor="ctr" bIns="91425" lIns="91425" rIns="91425" tIns="91425">
+            <a:noAutofit/>
+          </a:bodyPr>
+          <a:lstStyle/>
+          <a:p>
+            <a:pPr>
+              <a:spcBef>
+                <a:spcPts val="0"/>
+              </a:spcBef>
+              <a:buNone/>
+            </a:pPr>
+            <a:r>
+              <a:t/>
+            </a:r>
+            <a:endParaRPr/>
           </a:p>
         </p:txBody>
       </p:sp>
@@ -6062,7 +6516,7 @@
   <p:cSld>
     <p:spTree>
       <p:nvGrpSpPr>
-        <p:cNvPr id="81" name="Shape 81"/>
+        <p:cNvPr id="82" name="Shape 82"/>
         <p:cNvGrpSpPr/>
         <p:nvPr/>
       </p:nvGrpSpPr>
@@ -6076,7 +6530,7 @@
       </p:grpSpPr>
       <p:pic>
         <p:nvPicPr>
-          <p:cNvPr id="82" name="Shape 82"/>
+          <p:cNvPr id="83" name="Shape 83"/>
           <p:cNvPicPr preferRelativeResize="0"/>
           <p:nvPr/>
         </p:nvPicPr>
@@ -6104,13 +6558,13 @@
       </p:pic>
       <p:sp>
         <p:nvSpPr>
-          <p:cNvPr id="83" name="Shape 83"/>
+          <p:cNvPr id="84" name="Shape 84"/>
           <p:cNvSpPr/>
           <p:nvPr/>
         </p:nvSpPr>
         <p:spPr>
           <a:xfrm>
-            <a:off x="0" y="287825"/>
+            <a:off x="0" y="299025"/>
             <a:ext cx="1364699" cy="260099"/>
           </a:xfrm>
           <a:prstGeom prst="rect">
@@ -6148,7 +6602,7 @@
       </p:sp>
       <p:sp>
         <p:nvSpPr>
-          <p:cNvPr id="84" name="Shape 84"/>
+          <p:cNvPr id="85" name="Shape 85"/>
           <p:cNvSpPr txBox="1"/>
           <p:nvPr/>
         </p:nvSpPr>
@@ -6184,6 +6638,48 @@
                 </a:solidFill>
               </a:rPr>
               <a:t>RFE’s that are about to expire in 35 days.</a:t>
+            </a:r>
+          </a:p>
+        </p:txBody>
+      </p:sp>
+      <p:sp>
+        <p:nvSpPr>
+          <p:cNvPr id="86" name="Shape 86"/>
+          <p:cNvSpPr txBox="1"/>
+          <p:nvPr/>
+        </p:nvSpPr>
+        <p:spPr>
+          <a:xfrm>
+            <a:off x="6073500" y="2780325"/>
+            <a:ext cx="3070499" cy="426899"/>
+          </a:xfrm>
+          <a:prstGeom prst="rect">
+            <a:avLst/>
+          </a:prstGeom>
+          <a:noFill/>
+          <a:ln>
+            <a:noFill/>
+          </a:ln>
+        </p:spPr>
+        <p:txBody>
+          <a:bodyPr anchorCtr="0" anchor="t" bIns="91425" lIns="91425" rIns="91425" tIns="91425">
+            <a:noAutofit/>
+          </a:bodyPr>
+          <a:lstStyle/>
+          <a:p>
+            <a:pPr lvl="0" rtl="0">
+              <a:spcBef>
+                <a:spcPts val="0"/>
+              </a:spcBef>
+              <a:buNone/>
+            </a:pPr>
+            <a:r>
+              <a:rPr lang="en" sz="1200">
+                <a:solidFill>
+                  <a:srgbClr val="FF0000"/>
+                </a:solidFill>
+              </a:rPr>
+              <a:t>RFE’s that recently expired.</a:t>
             </a:r>
           </a:p>
         </p:txBody>
@@ -6204,7 +6700,7 @@
   <p:cSld>
     <p:spTree>
       <p:nvGrpSpPr>
-        <p:cNvPr id="88" name="Shape 88"/>
+        <p:cNvPr id="90" name="Shape 90"/>
         <p:cNvGrpSpPr/>
         <p:nvPr/>
       </p:nvGrpSpPr>
@@ -6218,7 +6714,7 @@
       </p:grpSpPr>
       <p:pic>
         <p:nvPicPr>
-          <p:cNvPr id="89" name="Shape 89"/>
+          <p:cNvPr id="91" name="Shape 91"/>
           <p:cNvPicPr preferRelativeResize="0"/>
           <p:nvPr/>
         </p:nvPicPr>
@@ -6246,14 +6742,14 @@
       </p:pic>
       <p:sp>
         <p:nvSpPr>
-          <p:cNvPr id="90" name="Shape 90"/>
+          <p:cNvPr id="92" name="Shape 92"/>
           <p:cNvSpPr txBox="1"/>
           <p:nvPr/>
         </p:nvSpPr>
         <p:spPr>
           <a:xfrm>
-            <a:off x="5925750" y="218375"/>
-            <a:ext cx="3031499" cy="656999"/>
+            <a:off x="4345050" y="218375"/>
+            <a:ext cx="4612200" cy="392399"/>
           </a:xfrm>
           <a:prstGeom prst="rect">
             <a:avLst/>
@@ -6281,7 +6777,7 @@
                   <a:srgbClr val="FF0000"/>
                 </a:solidFill>
               </a:rPr>
-              <a:t>System Admin view of the RFE Details page.</a:t>
+              <a:t>System Admin’s view of the RFE Details page.</a:t>
             </a:r>
           </a:p>
         </p:txBody>
@@ -6302,7 +6798,7 @@
   <p:cSld>
     <p:spTree>
       <p:nvGrpSpPr>
-        <p:cNvPr id="94" name="Shape 94"/>
+        <p:cNvPr id="96" name="Shape 96"/>
         <p:cNvGrpSpPr/>
         <p:nvPr/>
       </p:nvGrpSpPr>
@@ -6316,7 +6812,7 @@
       </p:grpSpPr>
       <p:pic>
         <p:nvPicPr>
-          <p:cNvPr id="95" name="Shape 95"/>
+          <p:cNvPr id="97" name="Shape 97"/>
           <p:cNvPicPr preferRelativeResize="0"/>
           <p:nvPr/>
         </p:nvPicPr>
@@ -6344,7 +6840,7 @@
       </p:pic>
       <p:sp>
         <p:nvSpPr>
-          <p:cNvPr id="96" name="Shape 96"/>
+          <p:cNvPr id="98" name="Shape 98"/>
           <p:cNvSpPr/>
           <p:nvPr/>
         </p:nvSpPr>
@@ -6402,7 +6898,7 @@
   <p:cSld>
     <p:spTree>
       <p:nvGrpSpPr>
-        <p:cNvPr id="100" name="Shape 100"/>
+        <p:cNvPr id="102" name="Shape 102"/>
         <p:cNvGrpSpPr/>
         <p:nvPr/>
       </p:nvGrpSpPr>
@@ -6416,7 +6912,7 @@
       </p:grpSpPr>
       <p:pic>
         <p:nvPicPr>
-          <p:cNvPr id="101" name="Shape 101"/>
+          <p:cNvPr id="103" name="Shape 103"/>
           <p:cNvPicPr preferRelativeResize="0"/>
           <p:nvPr/>
         </p:nvPicPr>
@@ -6442,6 +6938,50 @@
           </a:ln>
         </p:spPr>
       </p:pic>
+      <p:sp>
+        <p:nvSpPr>
+          <p:cNvPr id="104" name="Shape 104"/>
+          <p:cNvSpPr/>
+          <p:nvPr/>
+        </p:nvSpPr>
+        <p:spPr>
+          <a:xfrm>
+            <a:off x="8259700" y="2430400"/>
+            <a:ext cx="806100" cy="260099"/>
+          </a:xfrm>
+          <a:prstGeom prst="rect">
+            <a:avLst/>
+          </a:prstGeom>
+          <a:noFill/>
+          <a:ln cap="flat" cmpd="sng" w="38100">
+            <a:solidFill>
+              <a:srgbClr val="FF0000"/>
+            </a:solidFill>
+            <a:prstDash val="solid"/>
+            <a:round/>
+            <a:headEnd len="med" w="med" type="none"/>
+            <a:tailEnd len="med" w="med" type="none"/>
+          </a:ln>
+        </p:spPr>
+        <p:txBody>
+          <a:bodyPr anchorCtr="0" anchor="ctr" bIns="91425" lIns="91425" rIns="91425" tIns="91425">
+            <a:noAutofit/>
+          </a:bodyPr>
+          <a:lstStyle/>
+          <a:p>
+            <a:pPr>
+              <a:spcBef>
+                <a:spcPts val="0"/>
+              </a:spcBef>
+              <a:buNone/>
+            </a:pPr>
+            <a:r>
+              <a:t/>
+            </a:r>
+            <a:endParaRPr/>
+          </a:p>
+        </p:txBody>
+      </p:sp>
     </p:spTree>
   </p:cSld>
   <p:clrMapOvr>

</xml_diff>